<commit_message>
feat(mbr): add structured pptx template with separate table/chart placeholders
</commit_message>
<xml_diff>
--- a/pptx_templates/mbr_template.pptx
+++ b/pptx_templates/mbr_template.pptx
@@ -3126,7 +3126,7 @@
           <a:lstStyle/>
           <a:p>
             <a:r>
-              <a:t>Generated by SBS MBR (Template Placeholder)</a:t>
+              <a:t>{{MBR_MONTH}}</a:t>
             </a:r>
           </a:p>
         </p:txBody>
@@ -3151,57 +3151,130 @@
       <p:grpSpPr/>
       <p:sp>
         <p:nvSpPr>
-          <p:cNvPr id="2" name="Title 1"/>
-          <p:cNvSpPr>
-            <a:spLocks noGrp="1"/>
-          </p:cNvSpPr>
-          <p:nvPr>
-            <p:ph type="title"/>
-          </p:nvPr>
-        </p:nvSpPr>
-        <p:spPr/>
-        <p:txBody>
-          <a:bodyPr/>
-          <a:lstStyle/>
-          <a:p>
-            <a:r>
-              <a:t>KPIs (Placeholder Tokens)</a:t>
-            </a:r>
-          </a:p>
-        </p:txBody>
-      </p:sp>
-      <p:sp>
-        <p:nvSpPr>
-          <p:cNvPr id="3" name="Content Placeholder 2"/>
-          <p:cNvSpPr>
-            <a:spLocks noGrp="1"/>
-          </p:cNvSpPr>
-          <p:nvPr>
-            <p:ph idx="1"/>
-          </p:nvPr>
-        </p:nvSpPr>
-        <p:spPr/>
-        <p:txBody>
-          <a:bodyPr/>
-          <a:lstStyle/>
-          <a:p>
-            <a:r>
-              <a:t>{{MBR_MONTH}}</a:t>
-            </a:r>
-          </a:p>
-          <a:p>
-            <a:r>
-              <a:t>Total Netto: {{TOTAL_NET}}</a:t>
-            </a:r>
-          </a:p>
-          <a:p>
-            <a:r>
-              <a:t>Top Suppliers: {{TOP_SUPPLIERS_TABLE}}</a:t>
-            </a:r>
-          </a:p>
-          <a:p>
-            <a:r>
-              <a:t>Budget Chart: {{BUDGET_CHART}}</a:t>
+          <p:cNvPr id="2" name="TextBox 1"/>
+          <p:cNvSpPr txBox="1"/>
+          <p:nvPr/>
+        </p:nvSpPr>
+        <p:spPr>
+          <a:xfrm>
+            <a:off x="548640" y="274320"/>
+            <a:ext cx="10972800" cy="548640"/>
+          </a:xfrm>
+          <a:prstGeom prst="rect">
+            <a:avLst/>
+          </a:prstGeom>
+          <a:noFill/>
+        </p:spPr>
+        <p:txBody>
+          <a:bodyPr wrap="none">
+            <a:spAutoFit/>
+          </a:bodyPr>
+          <a:lstStyle/>
+          <a:p>
+            <a:pPr>
+              <a:defRPr sz="2800"/>
+            </a:pPr>
+            <a:r>
+              <a:t>KPIs &amp; Insights</a:t>
+            </a:r>
+          </a:p>
+        </p:txBody>
+      </p:sp>
+      <p:sp>
+        <p:nvSpPr>
+          <p:cNvPr id="3" name="TextBox 2"/>
+          <p:cNvSpPr txBox="1"/>
+          <p:nvPr/>
+        </p:nvSpPr>
+        <p:spPr>
+          <a:xfrm>
+            <a:off x="548640" y="1097280"/>
+            <a:ext cx="5486400" cy="1280160"/>
+          </a:xfrm>
+          <a:prstGeom prst="rect">
+            <a:avLst/>
+          </a:prstGeom>
+          <a:noFill/>
+        </p:spPr>
+        <p:txBody>
+          <a:bodyPr wrap="none">
+            <a:spAutoFit/>
+          </a:bodyPr>
+          <a:lstStyle/>
+          <a:p>
+            <a:r>
+              <a:t>{{COVERAGE_NOTE}}</a:t>
+            </a:r>
+          </a:p>
+          <a:p>
+            <a:r>
+              <a:t>Rechnungen: {{INVOICE_COUNT}}</a:t>
+            </a:r>
+          </a:p>
+          <a:p>
+            <a:r>
+              <a:t>Netto: {{TOTAL_NET}}</a:t>
+            </a:r>
+          </a:p>
+          <a:p>
+            <a:r>
+              <a:t>Brutto: {{TOTAL_GROSS}}</a:t>
+            </a:r>
+          </a:p>
+        </p:txBody>
+      </p:sp>
+      <p:sp>
+        <p:nvSpPr>
+          <p:cNvPr id="4" name="TextBox 3"/>
+          <p:cNvSpPr txBox="1"/>
+          <p:nvPr/>
+        </p:nvSpPr>
+        <p:spPr>
+          <a:xfrm>
+            <a:off x="548640" y="2651760"/>
+            <a:ext cx="5486400" cy="3474720"/>
+          </a:xfrm>
+          <a:prstGeom prst="rect">
+            <a:avLst/>
+          </a:prstGeom>
+          <a:noFill/>
+        </p:spPr>
+        <p:txBody>
+          <a:bodyPr wrap="none">
+            <a:spAutoFit/>
+          </a:bodyPr>
+          <a:lstStyle/>
+          <a:p>
+            <a:r>
+              <a:t>{{TOP_SUPPLIERS_TABLE}}</a:t>
+            </a:r>
+          </a:p>
+        </p:txBody>
+      </p:sp>
+      <p:sp>
+        <p:nvSpPr>
+          <p:cNvPr id="5" name="TextBox 4"/>
+          <p:cNvSpPr txBox="1"/>
+          <p:nvPr/>
+        </p:nvSpPr>
+        <p:spPr>
+          <a:xfrm>
+            <a:off x="6400800" y="2651760"/>
+            <a:ext cx="5120640" cy="3474720"/>
+          </a:xfrm>
+          <a:prstGeom prst="rect">
+            <a:avLst/>
+          </a:prstGeom>
+          <a:noFill/>
+        </p:spPr>
+        <p:txBody>
+          <a:bodyPr wrap="none">
+            <a:spAutoFit/>
+          </a:bodyPr>
+          <a:lstStyle/>
+          <a:p>
+            <a:r>
+              <a:t>{{BUDGET_CHART}}</a:t>
             </a:r>
           </a:p>
         </p:txBody>

</xml_diff>